<commit_message>
Added some texturing stuff
</commit_message>
<xml_diff>
--- a/Lectures/Day_12 Texturing, part 1/INFO3111_Texture_mapping (code on last slide).pptx
+++ b/Lectures/Day_12 Texturing, part 1/INFO3111_Texture_mapping (code on last slide).pptx
@@ -228,7 +228,7 @@
             <a:fld id="{6E28E25E-87BB-46EA-8F9E-473DAE89420C}" type="datetimeFigureOut">
               <a:rPr lang="en-CA" smtClean="0"/>
               <a:pPr/>
-              <a:t>2024-06-13</a:t>
+              <a:t>2025-07-31</a:t>
             </a:fld>
             <a:endParaRPr lang="en-CA"/>
           </a:p>
@@ -394,7 +394,7 @@
           <a:p>
             <a:fld id="{D61BC0C6-8165-4029-93EB-E0CF8A3883CE}" type="datetimeFigureOut">
               <a:rPr lang="en-CA" smtClean="0"/>
-              <a:t>2024-06-13</a:t>
+              <a:t>2025-07-31</a:t>
             </a:fld>
             <a:endParaRPr lang="en-CA"/>
           </a:p>
@@ -936,7 +936,7 @@
             <a:fld id="{667A62CB-8588-4D98-8E9E-C665A03A0EA4}" type="datetimeFigureOut">
               <a:rPr lang="en-CA" smtClean="0"/>
               <a:pPr/>
-              <a:t>2024-06-13</a:t>
+              <a:t>2025-07-31</a:t>
             </a:fld>
             <a:endParaRPr lang="en-CA"/>
           </a:p>
@@ -1103,7 +1103,7 @@
             <a:fld id="{667A62CB-8588-4D98-8E9E-C665A03A0EA4}" type="datetimeFigureOut">
               <a:rPr lang="en-CA" smtClean="0"/>
               <a:pPr/>
-              <a:t>2024-06-13</a:t>
+              <a:t>2025-07-31</a:t>
             </a:fld>
             <a:endParaRPr lang="en-CA"/>
           </a:p>
@@ -1280,7 +1280,7 @@
             <a:fld id="{667A62CB-8588-4D98-8E9E-C665A03A0EA4}" type="datetimeFigureOut">
               <a:rPr lang="en-CA" smtClean="0"/>
               <a:pPr/>
-              <a:t>2024-06-13</a:t>
+              <a:t>2025-07-31</a:t>
             </a:fld>
             <a:endParaRPr lang="en-CA"/>
           </a:p>
@@ -1447,7 +1447,7 @@
             <a:fld id="{667A62CB-8588-4D98-8E9E-C665A03A0EA4}" type="datetimeFigureOut">
               <a:rPr lang="en-CA" smtClean="0"/>
               <a:pPr/>
-              <a:t>2024-06-13</a:t>
+              <a:t>2025-07-31</a:t>
             </a:fld>
             <a:endParaRPr lang="en-CA"/>
           </a:p>
@@ -1690,7 +1690,7 @@
             <a:fld id="{667A62CB-8588-4D98-8E9E-C665A03A0EA4}" type="datetimeFigureOut">
               <a:rPr lang="en-CA" smtClean="0"/>
               <a:pPr/>
-              <a:t>2024-06-13</a:t>
+              <a:t>2025-07-31</a:t>
             </a:fld>
             <a:endParaRPr lang="en-CA"/>
           </a:p>
@@ -1975,7 +1975,7 @@
             <a:fld id="{667A62CB-8588-4D98-8E9E-C665A03A0EA4}" type="datetimeFigureOut">
               <a:rPr lang="en-CA" smtClean="0"/>
               <a:pPr/>
-              <a:t>2024-06-13</a:t>
+              <a:t>2025-07-31</a:t>
             </a:fld>
             <a:endParaRPr lang="en-CA"/>
           </a:p>
@@ -2394,7 +2394,7 @@
             <a:fld id="{667A62CB-8588-4D98-8E9E-C665A03A0EA4}" type="datetimeFigureOut">
               <a:rPr lang="en-CA" smtClean="0"/>
               <a:pPr/>
-              <a:t>2024-06-13</a:t>
+              <a:t>2025-07-31</a:t>
             </a:fld>
             <a:endParaRPr lang="en-CA"/>
           </a:p>
@@ -2509,7 +2509,7 @@
             <a:fld id="{667A62CB-8588-4D98-8E9E-C665A03A0EA4}" type="datetimeFigureOut">
               <a:rPr lang="en-CA" smtClean="0"/>
               <a:pPr/>
-              <a:t>2024-06-13</a:t>
+              <a:t>2025-07-31</a:t>
             </a:fld>
             <a:endParaRPr lang="en-CA"/>
           </a:p>
@@ -2601,7 +2601,7 @@
             <a:fld id="{667A62CB-8588-4D98-8E9E-C665A03A0EA4}" type="datetimeFigureOut">
               <a:rPr lang="en-CA" smtClean="0"/>
               <a:pPr/>
-              <a:t>2024-06-13</a:t>
+              <a:t>2025-07-31</a:t>
             </a:fld>
             <a:endParaRPr lang="en-CA"/>
           </a:p>
@@ -2875,7 +2875,7 @@
             <a:fld id="{667A62CB-8588-4D98-8E9E-C665A03A0EA4}" type="datetimeFigureOut">
               <a:rPr lang="en-CA" smtClean="0"/>
               <a:pPr/>
-              <a:t>2024-06-13</a:t>
+              <a:t>2025-07-31</a:t>
             </a:fld>
             <a:endParaRPr lang="en-CA"/>
           </a:p>
@@ -3125,7 +3125,7 @@
             <a:fld id="{667A62CB-8588-4D98-8E9E-C665A03A0EA4}" type="datetimeFigureOut">
               <a:rPr lang="en-CA" smtClean="0"/>
               <a:pPr/>
-              <a:t>2024-06-13</a:t>
+              <a:t>2025-07-31</a:t>
             </a:fld>
             <a:endParaRPr lang="en-CA"/>
           </a:p>
@@ -3335,7 +3335,7 @@
             <a:fld id="{667A62CB-8588-4D98-8E9E-C665A03A0EA4}" type="datetimeFigureOut">
               <a:rPr lang="en-CA" smtClean="0"/>
               <a:pPr/>
-              <a:t>2024-06-13</a:t>
+              <a:t>2025-07-31</a:t>
             </a:fld>
             <a:endParaRPr lang="en-CA"/>
           </a:p>
@@ -8259,7 +8259,7 @@
         </p:nvSpPr>
         <p:spPr>
           <a:xfrm>
-            <a:off x="762000" y="685800"/>
+            <a:off x="838200" y="675786"/>
             <a:ext cx="1295400" cy="461665"/>
           </a:xfrm>
           <a:prstGeom prst="rect">

</xml_diff>

<commit_message>
Added a powerpoint. Corrected spelling error
</commit_message>
<xml_diff>
--- a/Lectures/Day_12 Texturing, part 1/INFO3111_Texture_mapping (code on last slide).pptx
+++ b/Lectures/Day_12 Texturing, part 1/INFO3111_Texture_mapping (code on last slide).pptx
@@ -5,10 +5,10 @@
     <p:sldMasterId id="2147483648" r:id="rId1"/>
   </p:sldMasterIdLst>
   <p:notesMasterIdLst>
-    <p:notesMasterId r:id="rId19"/>
+    <p:notesMasterId r:id="rId18"/>
   </p:notesMasterIdLst>
   <p:handoutMasterIdLst>
-    <p:handoutMasterId r:id="rId20"/>
+    <p:handoutMasterId r:id="rId19"/>
   </p:handoutMasterIdLst>
   <p:sldIdLst>
     <p:sldId id="268" r:id="rId2"/>
@@ -26,8 +26,7 @@
     <p:sldId id="263" r:id="rId14"/>
     <p:sldId id="264" r:id="rId15"/>
     <p:sldId id="265" r:id="rId16"/>
-    <p:sldId id="261" r:id="rId17"/>
-    <p:sldId id="260" r:id="rId18"/>
+    <p:sldId id="260" r:id="rId17"/>
   </p:sldIdLst>
   <p:sldSz cx="9144000" cy="5143500" type="screen16x9"/>
   <p:notesSz cx="9296400" cy="7010400"/>
@@ -228,7 +227,7 @@
             <a:fld id="{6E28E25E-87BB-46EA-8F9E-473DAE89420C}" type="datetimeFigureOut">
               <a:rPr lang="en-CA" smtClean="0"/>
               <a:pPr/>
-              <a:t>2025-07-31</a:t>
+              <a:t>2025-08-07</a:t>
             </a:fld>
             <a:endParaRPr lang="en-CA"/>
           </a:p>
@@ -394,7 +393,7 @@
           <a:p>
             <a:fld id="{D61BC0C6-8165-4029-93EB-E0CF8A3883CE}" type="datetimeFigureOut">
               <a:rPr lang="en-CA" smtClean="0"/>
-              <a:t>2025-07-31</a:t>
+              <a:t>2025-08-07</a:t>
             </a:fld>
             <a:endParaRPr lang="en-CA"/>
           </a:p>
@@ -936,7 +935,7 @@
             <a:fld id="{667A62CB-8588-4D98-8E9E-C665A03A0EA4}" type="datetimeFigureOut">
               <a:rPr lang="en-CA" smtClean="0"/>
               <a:pPr/>
-              <a:t>2025-07-31</a:t>
+              <a:t>2025-08-07</a:t>
             </a:fld>
             <a:endParaRPr lang="en-CA"/>
           </a:p>
@@ -1103,7 +1102,7 @@
             <a:fld id="{667A62CB-8588-4D98-8E9E-C665A03A0EA4}" type="datetimeFigureOut">
               <a:rPr lang="en-CA" smtClean="0"/>
               <a:pPr/>
-              <a:t>2025-07-31</a:t>
+              <a:t>2025-08-07</a:t>
             </a:fld>
             <a:endParaRPr lang="en-CA"/>
           </a:p>
@@ -1280,7 +1279,7 @@
             <a:fld id="{667A62CB-8588-4D98-8E9E-C665A03A0EA4}" type="datetimeFigureOut">
               <a:rPr lang="en-CA" smtClean="0"/>
               <a:pPr/>
-              <a:t>2025-07-31</a:t>
+              <a:t>2025-08-07</a:t>
             </a:fld>
             <a:endParaRPr lang="en-CA"/>
           </a:p>
@@ -1447,7 +1446,7 @@
             <a:fld id="{667A62CB-8588-4D98-8E9E-C665A03A0EA4}" type="datetimeFigureOut">
               <a:rPr lang="en-CA" smtClean="0"/>
               <a:pPr/>
-              <a:t>2025-07-31</a:t>
+              <a:t>2025-08-07</a:t>
             </a:fld>
             <a:endParaRPr lang="en-CA"/>
           </a:p>
@@ -1690,7 +1689,7 @@
             <a:fld id="{667A62CB-8588-4D98-8E9E-C665A03A0EA4}" type="datetimeFigureOut">
               <a:rPr lang="en-CA" smtClean="0"/>
               <a:pPr/>
-              <a:t>2025-07-31</a:t>
+              <a:t>2025-08-07</a:t>
             </a:fld>
             <a:endParaRPr lang="en-CA"/>
           </a:p>
@@ -1975,7 +1974,7 @@
             <a:fld id="{667A62CB-8588-4D98-8E9E-C665A03A0EA4}" type="datetimeFigureOut">
               <a:rPr lang="en-CA" smtClean="0"/>
               <a:pPr/>
-              <a:t>2025-07-31</a:t>
+              <a:t>2025-08-07</a:t>
             </a:fld>
             <a:endParaRPr lang="en-CA"/>
           </a:p>
@@ -2394,7 +2393,7 @@
             <a:fld id="{667A62CB-8588-4D98-8E9E-C665A03A0EA4}" type="datetimeFigureOut">
               <a:rPr lang="en-CA" smtClean="0"/>
               <a:pPr/>
-              <a:t>2025-07-31</a:t>
+              <a:t>2025-08-07</a:t>
             </a:fld>
             <a:endParaRPr lang="en-CA"/>
           </a:p>
@@ -2509,7 +2508,7 @@
             <a:fld id="{667A62CB-8588-4D98-8E9E-C665A03A0EA4}" type="datetimeFigureOut">
               <a:rPr lang="en-CA" smtClean="0"/>
               <a:pPr/>
-              <a:t>2025-07-31</a:t>
+              <a:t>2025-08-07</a:t>
             </a:fld>
             <a:endParaRPr lang="en-CA"/>
           </a:p>
@@ -2601,7 +2600,7 @@
             <a:fld id="{667A62CB-8588-4D98-8E9E-C665A03A0EA4}" type="datetimeFigureOut">
               <a:rPr lang="en-CA" smtClean="0"/>
               <a:pPr/>
-              <a:t>2025-07-31</a:t>
+              <a:t>2025-08-07</a:t>
             </a:fld>
             <a:endParaRPr lang="en-CA"/>
           </a:p>
@@ -2875,7 +2874,7 @@
             <a:fld id="{667A62CB-8588-4D98-8E9E-C665A03A0EA4}" type="datetimeFigureOut">
               <a:rPr lang="en-CA" smtClean="0"/>
               <a:pPr/>
-              <a:t>2025-07-31</a:t>
+              <a:t>2025-08-07</a:t>
             </a:fld>
             <a:endParaRPr lang="en-CA"/>
           </a:p>
@@ -3125,7 +3124,7 @@
             <a:fld id="{667A62CB-8588-4D98-8E9E-C665A03A0EA4}" type="datetimeFigureOut">
               <a:rPr lang="en-CA" smtClean="0"/>
               <a:pPr/>
-              <a:t>2025-07-31</a:t>
+              <a:t>2025-08-07</a:t>
             </a:fld>
             <a:endParaRPr lang="en-CA"/>
           </a:p>
@@ -3335,7 +3334,7 @@
             <a:fld id="{667A62CB-8588-4D98-8E9E-C665A03A0EA4}" type="datetimeFigureOut">
               <a:rPr lang="en-CA" smtClean="0"/>
               <a:pPr/>
-              <a:t>2025-07-31</a:t>
+              <a:t>2025-08-07</a:t>
             </a:fld>
             <a:endParaRPr lang="en-CA"/>
           </a:p>
@@ -5913,15 +5912,15 @@
           <p:cNvPr id="28" name="Straight Arrow Connector 27"/>
           <p:cNvCxnSpPr>
             <a:cxnSpLocks/>
-            <a:stCxn id="15" idx="1"/>
-            <a:endCxn id="17" idx="3"/>
+            <a:stCxn id="14" idx="1"/>
+            <a:endCxn id="9" idx="3"/>
           </p:cNvCxnSpPr>
           <p:nvPr/>
         </p:nvCxnSpPr>
         <p:spPr>
-          <a:xfrm flipH="1">
-            <a:off x="1828800" y="1771650"/>
-            <a:ext cx="609600" cy="762000"/>
+          <a:xfrm flipH="1" flipV="1">
+            <a:off x="1828800" y="1009650"/>
+            <a:ext cx="609600" cy="76200"/>
           </a:xfrm>
           <a:prstGeom prst="straightConnector1">
             <a:avLst/>
@@ -5955,6 +5954,49 @@
           <a:xfrm flipH="1" flipV="1">
             <a:off x="4343400" y="1854096"/>
             <a:ext cx="914400" cy="19050"/>
+          </a:xfrm>
+          <a:prstGeom prst="straightConnector1">
+            <a:avLst/>
+          </a:prstGeom>
+          <a:ln>
+            <a:tailEnd type="arrow"/>
+          </a:ln>
+        </p:spPr>
+        <p:style>
+          <a:lnRef idx="3">
+            <a:schemeClr val="accent6"/>
+          </a:lnRef>
+          <a:fillRef idx="0">
+            <a:schemeClr val="accent6"/>
+          </a:fillRef>
+          <a:effectRef idx="2">
+            <a:schemeClr val="accent6"/>
+          </a:effectRef>
+          <a:fontRef idx="minor">
+            <a:schemeClr val="tx1"/>
+          </a:fontRef>
+        </p:style>
+      </p:cxnSp>
+      <p:cxnSp>
+        <p:nvCxnSpPr>
+          <p:cNvPr id="5" name="Straight Arrow Connector 4">
+            <a:extLst>
+              <a:ext uri="{FF2B5EF4-FFF2-40B4-BE49-F238E27FC236}">
+                <a16:creationId xmlns:a16="http://schemas.microsoft.com/office/drawing/2014/main" id="{2826A309-2965-E860-49A0-DA4EB0F0F1DA}"/>
+              </a:ext>
+            </a:extLst>
+          </p:cNvPr>
+          <p:cNvCxnSpPr>
+            <a:cxnSpLocks/>
+            <a:stCxn id="15" idx="1"/>
+            <a:endCxn id="17" idx="3"/>
+          </p:cNvCxnSpPr>
+          <p:nvPr/>
+        </p:nvCxnSpPr>
+        <p:spPr>
+          <a:xfrm flipH="1">
+            <a:off x="1828800" y="1771650"/>
+            <a:ext cx="609600" cy="762000"/>
           </a:xfrm>
           <a:prstGeom prst="straightConnector1">
             <a:avLst/>
@@ -6951,31 +6993,6 @@
 </file>
 
 <file path=ppt/slides/slide16.xml><?xml version="1.0" encoding="utf-8"?>
-<p:sld xmlns:a="http://schemas.openxmlformats.org/drawingml/2006/main" xmlns:r="http://schemas.openxmlformats.org/officeDocument/2006/relationships" xmlns:p="http://schemas.openxmlformats.org/presentationml/2006/main">
-  <p:cSld>
-    <p:spTree>
-      <p:nvGrpSpPr>
-        <p:cNvPr id="1" name=""/>
-        <p:cNvGrpSpPr/>
-        <p:nvPr/>
-      </p:nvGrpSpPr>
-      <p:grpSpPr>
-        <a:xfrm>
-          <a:off x="0" y="0"/>
-          <a:ext cx="0" cy="0"/>
-          <a:chOff x="0" y="0"/>
-          <a:chExt cx="0" cy="0"/>
-        </a:xfrm>
-      </p:grpSpPr>
-    </p:spTree>
-  </p:cSld>
-  <p:clrMapOvr>
-    <a:masterClrMapping/>
-  </p:clrMapOvr>
-</p:sld>
-</file>
-
-<file path=ppt/slides/slide17.xml><?xml version="1.0" encoding="utf-8"?>
 <p:sld xmlns:a="http://schemas.openxmlformats.org/drawingml/2006/main" xmlns:r="http://schemas.openxmlformats.org/officeDocument/2006/relationships" xmlns:p="http://schemas.openxmlformats.org/presentationml/2006/main">
   <p:cSld>
     <p:spTree>
@@ -9490,7 +9507,7 @@
             <a:pPr algn="ctr"/>
             <a:r>
               <a:rPr lang="en-CA" dirty="0"/>
-              <a:t>Convert</a:t>
+              <a:t>Copy to GPU</a:t>
             </a:r>
           </a:p>
         </p:txBody>
@@ -9685,8 +9702,8 @@
         </p:nvSpPr>
         <p:spPr>
           <a:xfrm>
-            <a:off x="609600" y="438150"/>
-            <a:ext cx="1676400" cy="1524000"/>
+            <a:off x="304800" y="438150"/>
+            <a:ext cx="1981200" cy="1524000"/>
           </a:xfrm>
           <a:prstGeom prst="rect">
             <a:avLst/>
@@ -9728,15 +9745,22 @@
             <a:pPr algn="ctr"/>
             <a:r>
               <a:rPr lang="en-CA" dirty="0"/>
-              <a:t>(</a:t>
+              <a:t>(“</a:t>
             </a:r>
             <a:r>
               <a:rPr lang="en-CA" dirty="0" err="1"/>
-              <a:t>WallTexture</a:t>
-            </a:r>
-            <a:r>
-              <a:rPr lang="en-CA" dirty="0"/>
-              <a:t>)</a:t>
+              <a:t>SydneySweeny</a:t>
+            </a:r>
+            <a:r>
+              <a:rPr lang="en-CA" dirty="0"/>
+              <a:t>”)</a:t>
+            </a:r>
+          </a:p>
+          <a:p>
+            <a:pPr algn="ctr"/>
+            <a:r>
+              <a:rPr lang="en-CA" dirty="0"/>
+              <a:t>Texture #27</a:t>
             </a:r>
           </a:p>
         </p:txBody>
@@ -10042,6 +10066,7 @@
         <p:nvCxnSpPr>
           <p:cNvPr id="13" name="Straight Arrow Connector 12"/>
           <p:cNvCxnSpPr>
+            <a:cxnSpLocks/>
             <a:stCxn id="4" idx="3"/>
             <a:endCxn id="7" idx="1"/>
           </p:cNvCxnSpPr>
@@ -10057,7 +10082,9 @@
           </a:prstGeom>
           <a:ln w="69850">
             <a:solidFill>
-              <a:srgbClr val="FFFF00"/>
+              <a:schemeClr val="accent6">
+                <a:lumMod val="75000"/>
+              </a:schemeClr>
             </a:solidFill>
             <a:tailEnd type="triangle"/>
           </a:ln>
@@ -10096,7 +10123,9 @@
           </a:prstGeom>
           <a:ln w="69850">
             <a:solidFill>
-              <a:srgbClr val="FFFF00"/>
+              <a:schemeClr val="accent6">
+                <a:lumMod val="75000"/>
+              </a:schemeClr>
             </a:solidFill>
             <a:tailEnd type="triangle"/>
           </a:ln>
@@ -10197,7 +10226,7 @@
             <a:pPr algn="ctr"/>
             <a:r>
               <a:rPr lang="en-CA" dirty="0"/>
-              <a:t>(spiderman 15)</a:t>
+              <a:t>(Syndey)</a:t>
             </a:r>
           </a:p>
         </p:txBody>
@@ -10886,15 +10915,15 @@
           </p:cNvPr>
           <p:cNvCxnSpPr>
             <a:cxnSpLocks/>
-            <a:stCxn id="9" idx="1"/>
-            <a:endCxn id="16" idx="3"/>
+            <a:stCxn id="7" idx="1"/>
+            <a:endCxn id="10" idx="3"/>
           </p:cNvCxnSpPr>
           <p:nvPr/>
         </p:nvCxnSpPr>
         <p:spPr>
           <a:xfrm flipH="1" flipV="1">
-            <a:off x="5334000" y="2190750"/>
-            <a:ext cx="1143000" cy="641487"/>
+            <a:off x="5334000" y="1009650"/>
+            <a:ext cx="1156607" cy="342900"/>
           </a:xfrm>
           <a:prstGeom prst="straightConnector1">
             <a:avLst/>
@@ -11058,6 +11087,54 @@
           </a:p>
         </p:txBody>
       </p:sp>
+      <p:cxnSp>
+        <p:nvCxnSpPr>
+          <p:cNvPr id="3" name="Straight Arrow Connector 2">
+            <a:extLst>
+              <a:ext uri="{FF2B5EF4-FFF2-40B4-BE49-F238E27FC236}">
+                <a16:creationId xmlns:a16="http://schemas.microsoft.com/office/drawing/2014/main" id="{87664CAF-8FAC-A6E7-9191-6816FB2BDEF2}"/>
+              </a:ext>
+            </a:extLst>
+          </p:cNvPr>
+          <p:cNvCxnSpPr>
+            <a:cxnSpLocks/>
+            <a:stCxn id="10" idx="1"/>
+            <a:endCxn id="4" idx="3"/>
+          </p:cNvCxnSpPr>
+          <p:nvPr/>
+        </p:nvCxnSpPr>
+        <p:spPr>
+          <a:xfrm flipH="1">
+            <a:off x="2310649" y="1009650"/>
+            <a:ext cx="889751" cy="228600"/>
+          </a:xfrm>
+          <a:prstGeom prst="straightConnector1">
+            <a:avLst/>
+          </a:prstGeom>
+          <a:ln w="69850">
+            <a:solidFill>
+              <a:schemeClr val="accent6">
+                <a:lumMod val="75000"/>
+              </a:schemeClr>
+            </a:solidFill>
+            <a:tailEnd type="triangle"/>
+          </a:ln>
+        </p:spPr>
+        <p:style>
+          <a:lnRef idx="1">
+            <a:schemeClr val="accent1"/>
+          </a:lnRef>
+          <a:fillRef idx="0">
+            <a:schemeClr val="accent1"/>
+          </a:fillRef>
+          <a:effectRef idx="0">
+            <a:schemeClr val="accent1"/>
+          </a:effectRef>
+          <a:fontRef idx="minor">
+            <a:schemeClr val="tx1"/>
+          </a:fontRef>
+        </p:style>
+      </p:cxnSp>
     </p:spTree>
     <p:extLst>
       <p:ext uri="{BB962C8B-B14F-4D97-AF65-F5344CB8AC3E}">
@@ -11357,13 +11434,14 @@
         <p:nvCxnSpPr>
           <p:cNvPr id="24" name="Straight Arrow Connector 23"/>
           <p:cNvCxnSpPr>
-            <a:stCxn id="9" idx="3"/>
-            <a:endCxn id="14" idx="1"/>
+            <a:cxnSpLocks/>
+            <a:stCxn id="14" idx="1"/>
+            <a:endCxn id="9" idx="3"/>
           </p:cNvCxnSpPr>
           <p:nvPr/>
         </p:nvCxnSpPr>
         <p:spPr>
-          <a:xfrm>
+          <a:xfrm flipH="1" flipV="1">
             <a:off x="1981200" y="1009650"/>
             <a:ext cx="515904" cy="50692"/>
           </a:xfrm>

</xml_diff>